<commit_message>
Edits after first reading.
</commit_message>
<xml_diff>
--- a/paper/figures/nodesandPM.pptx
+++ b/paper/figures/nodesandPM.pptx
@@ -288,7 +288,7 @@
           <a:p>
             <a:fld id="{C41FA885-C87B-9843-BD31-F3F318DA0A00}" type="datetimeFigureOut">
               <a:rPr lang="en-US" smtClean="0"/>
-              <a:t>4/12/15</a:t>
+              <a:t>4/13/15</a:t>
             </a:fld>
             <a:endParaRPr lang="en-US"/>
           </a:p>
@@ -458,7 +458,7 @@
           <a:p>
             <a:fld id="{C41FA885-C87B-9843-BD31-F3F318DA0A00}" type="datetimeFigureOut">
               <a:rPr lang="en-US" smtClean="0"/>
-              <a:t>4/12/15</a:t>
+              <a:t>4/13/15</a:t>
             </a:fld>
             <a:endParaRPr lang="en-US"/>
           </a:p>
@@ -638,7 +638,7 @@
           <a:p>
             <a:fld id="{C41FA885-C87B-9843-BD31-F3F318DA0A00}" type="datetimeFigureOut">
               <a:rPr lang="en-US" smtClean="0"/>
-              <a:t>4/12/15</a:t>
+              <a:t>4/13/15</a:t>
             </a:fld>
             <a:endParaRPr lang="en-US"/>
           </a:p>
@@ -808,7 +808,7 @@
           <a:p>
             <a:fld id="{C41FA885-C87B-9843-BD31-F3F318DA0A00}" type="datetimeFigureOut">
               <a:rPr lang="en-US" smtClean="0"/>
-              <a:t>4/12/15</a:t>
+              <a:t>4/13/15</a:t>
             </a:fld>
             <a:endParaRPr lang="en-US"/>
           </a:p>
@@ -1054,7 +1054,7 @@
           <a:p>
             <a:fld id="{C41FA885-C87B-9843-BD31-F3F318DA0A00}" type="datetimeFigureOut">
               <a:rPr lang="en-US" smtClean="0"/>
-              <a:t>4/12/15</a:t>
+              <a:t>4/13/15</a:t>
             </a:fld>
             <a:endParaRPr lang="en-US"/>
           </a:p>
@@ -1342,7 +1342,7 @@
           <a:p>
             <a:fld id="{C41FA885-C87B-9843-BD31-F3F318DA0A00}" type="datetimeFigureOut">
               <a:rPr lang="en-US" smtClean="0"/>
-              <a:t>4/12/15</a:t>
+              <a:t>4/13/15</a:t>
             </a:fld>
             <a:endParaRPr lang="en-US"/>
           </a:p>
@@ -1764,7 +1764,7 @@
           <a:p>
             <a:fld id="{C41FA885-C87B-9843-BD31-F3F318DA0A00}" type="datetimeFigureOut">
               <a:rPr lang="en-US" smtClean="0"/>
-              <a:t>4/12/15</a:t>
+              <a:t>4/13/15</a:t>
             </a:fld>
             <a:endParaRPr lang="en-US"/>
           </a:p>
@@ -1882,7 +1882,7 @@
           <a:p>
             <a:fld id="{C41FA885-C87B-9843-BD31-F3F318DA0A00}" type="datetimeFigureOut">
               <a:rPr lang="en-US" smtClean="0"/>
-              <a:t>4/12/15</a:t>
+              <a:t>4/13/15</a:t>
             </a:fld>
             <a:endParaRPr lang="en-US"/>
           </a:p>
@@ -1977,7 +1977,7 @@
           <a:p>
             <a:fld id="{C41FA885-C87B-9843-BD31-F3F318DA0A00}" type="datetimeFigureOut">
               <a:rPr lang="en-US" smtClean="0"/>
-              <a:t>4/12/15</a:t>
+              <a:t>4/13/15</a:t>
             </a:fld>
             <a:endParaRPr lang="en-US"/>
           </a:p>
@@ -2254,7 +2254,7 @@
           <a:p>
             <a:fld id="{C41FA885-C87B-9843-BD31-F3F318DA0A00}" type="datetimeFigureOut">
               <a:rPr lang="en-US" smtClean="0"/>
-              <a:t>4/12/15</a:t>
+              <a:t>4/13/15</a:t>
             </a:fld>
             <a:endParaRPr lang="en-US"/>
           </a:p>
@@ -2507,7 +2507,7 @@
           <a:p>
             <a:fld id="{C41FA885-C87B-9843-BD31-F3F318DA0A00}" type="datetimeFigureOut">
               <a:rPr lang="en-US" smtClean="0"/>
-              <a:t>4/12/15</a:t>
+              <a:t>4/13/15</a:t>
             </a:fld>
             <a:endParaRPr lang="en-US"/>
           </a:p>
@@ -2720,7 +2720,7 @@
           <a:p>
             <a:fld id="{C41FA885-C87B-9843-BD31-F3F318DA0A00}" type="datetimeFigureOut">
               <a:rPr lang="en-US" smtClean="0"/>
-              <a:t>4/12/15</a:t>
+              <a:t>4/13/15</a:t>
             </a:fld>
             <a:endParaRPr lang="en-US"/>
           </a:p>
@@ -3095,6 +3095,47 @@
           <a:chExt cx="0" cy="0"/>
         </a:xfrm>
       </p:grpSpPr>
+      <p:pic>
+        <p:nvPicPr>
+          <p:cNvPr id="20" name="Picture 4" descr="C:\Users\Zhihao Jiang\Documents\My Dropbox\VHM\figures\elec_cond.png"/>
+          <p:cNvPicPr>
+            <a:picLocks noChangeAspect="1" noChangeArrowheads="1"/>
+          </p:cNvPicPr>
+          <p:nvPr>
+            <p:custDataLst>
+              <p:tags r:id="rId1"/>
+            </p:custDataLst>
+          </p:nvPr>
+        </p:nvPicPr>
+        <p:blipFill>
+          <a:blip r:embed="rId3" cstate="print">
+            <a:alphaModFix amt="45000"/>
+          </a:blip>
+          <a:srcRect/>
+          <a:stretch>
+            <a:fillRect/>
+          </a:stretch>
+        </p:blipFill>
+        <p:spPr bwMode="auto">
+          <a:xfrm>
+            <a:off x="809341" y="248187"/>
+            <a:ext cx="5448643" cy="5986415"/>
+          </a:xfrm>
+          <a:prstGeom prst="rect">
+            <a:avLst/>
+          </a:prstGeom>
+          <a:ln>
+            <a:noFill/>
+          </a:ln>
+          <a:effectLst>
+            <a:outerShdw blurRad="292100" dist="139700" dir="2700000" algn="tl" rotWithShape="0">
+              <a:srgbClr val="333333">
+                <a:alpha val="65000"/>
+              </a:srgbClr>
+            </a:outerShdw>
+          </a:effectLst>
+        </p:spPr>
+      </p:pic>
       <p:grpSp>
         <p:nvGrpSpPr>
           <p:cNvPr id="6" name="Group 5"/>
@@ -3103,11 +3144,14 @@
         </p:nvGrpSpPr>
         <p:grpSpPr>
           <a:xfrm>
-            <a:off x="1785032" y="1081149"/>
+            <a:off x="1263483" y="2443406"/>
             <a:ext cx="1081318" cy="1115470"/>
             <a:chOff x="1785032" y="1081149"/>
             <a:chExt cx="1081318" cy="1115470"/>
           </a:xfrm>
+          <a:solidFill>
+            <a:schemeClr val="bg1"/>
+          </a:solidFill>
         </p:grpSpPr>
         <p:sp>
           <p:nvSpPr>
@@ -3123,7 +3167,7 @@
             <a:prstGeom prst="ellipse">
               <a:avLst/>
             </a:prstGeom>
-            <a:noFill/>
+            <a:grpFill/>
             <a:ln>
               <a:solidFill>
                 <a:schemeClr val="tx1"/>
@@ -3167,7 +3211,7 @@
             <a:prstGeom prst="rect">
               <a:avLst/>
             </a:prstGeom>
-            <a:noFill/>
+            <a:grpFill/>
           </p:spPr>
           <p:txBody>
             <a:bodyPr wrap="none" rtlCol="0">
@@ -3192,11 +3236,14 @@
         </p:nvGrpSpPr>
         <p:grpSpPr>
           <a:xfrm>
-            <a:off x="3533663" y="3001141"/>
+            <a:off x="2109209" y="3934671"/>
             <a:ext cx="1081318" cy="1115470"/>
             <a:chOff x="1785032" y="1081149"/>
             <a:chExt cx="1081318" cy="1115470"/>
           </a:xfrm>
+          <a:solidFill>
+            <a:srgbClr val="FFFFFF"/>
+          </a:solidFill>
         </p:grpSpPr>
         <p:sp>
           <p:nvSpPr>
@@ -3212,7 +3259,7 @@
             <a:prstGeom prst="ellipse">
               <a:avLst/>
             </a:prstGeom>
-            <a:noFill/>
+            <a:grpFill/>
             <a:ln>
               <a:solidFill>
                 <a:schemeClr val="tx1"/>
@@ -3256,7 +3303,7 @@
             <a:prstGeom prst="rect">
               <a:avLst/>
             </a:prstGeom>
-            <a:noFill/>
+            <a:grpFill/>
           </p:spPr>
           <p:txBody>
             <a:bodyPr wrap="none" rtlCol="0">
@@ -3281,11 +3328,14 @@
         </p:nvGrpSpPr>
         <p:grpSpPr>
           <a:xfrm>
-            <a:off x="5215712" y="4871700"/>
+            <a:off x="4233540" y="4998176"/>
             <a:ext cx="1081318" cy="1115470"/>
             <a:chOff x="1785032" y="1081149"/>
             <a:chExt cx="1081318" cy="1115470"/>
           </a:xfrm>
+          <a:solidFill>
+            <a:srgbClr val="FFFFFF"/>
+          </a:solidFill>
         </p:grpSpPr>
         <p:sp>
           <p:nvSpPr>
@@ -3301,7 +3351,7 @@
             <a:prstGeom prst="ellipse">
               <a:avLst/>
             </a:prstGeom>
-            <a:noFill/>
+            <a:grpFill/>
             <a:ln>
               <a:solidFill>
                 <a:schemeClr val="tx1"/>
@@ -3345,7 +3395,7 @@
             <a:prstGeom prst="rect">
               <a:avLst/>
             </a:prstGeom>
-            <a:noFill/>
+            <a:grpFill/>
           </p:spPr>
           <p:txBody>
             <a:bodyPr wrap="none" rtlCol="0">
@@ -3366,20 +3416,20 @@
         <p:nvCxnSpPr>
           <p:cNvPr id="14" name="Straight Connector 13"/>
           <p:cNvCxnSpPr>
-            <a:stCxn id="4" idx="5"/>
+            <a:stCxn id="4" idx="4"/>
             <a:endCxn id="8" idx="1"/>
           </p:cNvCxnSpPr>
           <p:nvPr/>
         </p:nvCxnSpPr>
         <p:spPr>
           <a:xfrm>
-            <a:off x="2707995" y="2033262"/>
-            <a:ext cx="984023" cy="1131236"/>
+            <a:off x="1804142" y="3558876"/>
+            <a:ext cx="463422" cy="539152"/>
           </a:xfrm>
           <a:prstGeom prst="line">
             <a:avLst/>
           </a:prstGeom>
-          <a:ln>
+          <a:ln w="38100" cmpd="sng">
             <a:solidFill>
               <a:srgbClr val="000000"/>
             </a:solidFill>
@@ -3405,19 +3455,19 @@
           <p:cNvPr id="15" name="Straight Connector 14"/>
           <p:cNvCxnSpPr>
             <a:stCxn id="8" idx="5"/>
-            <a:endCxn id="11" idx="1"/>
+            <a:endCxn id="11" idx="2"/>
           </p:cNvCxnSpPr>
           <p:nvPr/>
         </p:nvCxnSpPr>
         <p:spPr>
           <a:xfrm>
-            <a:off x="4456626" y="3953254"/>
-            <a:ext cx="917441" cy="1081803"/>
+            <a:off x="3032172" y="4886784"/>
+            <a:ext cx="1201368" cy="669127"/>
           </a:xfrm>
           <a:prstGeom prst="line">
             <a:avLst/>
           </a:prstGeom>
-          <a:ln>
+          <a:ln w="38100" cmpd="sng">
             <a:solidFill>
               <a:srgbClr val="000000"/>
             </a:solidFill>
@@ -3446,7 +3496,7 @@
         </p:nvSpPr>
         <p:spPr>
           <a:xfrm>
-            <a:off x="3175331" y="1967734"/>
+            <a:off x="1294355" y="3774862"/>
             <a:ext cx="657151" cy="646331"/>
           </a:xfrm>
           <a:prstGeom prst="rect">
@@ -3470,13 +3520,13 @@
       </p:sp>
       <p:sp>
         <p:nvSpPr>
-          <p:cNvPr id="19" name="TextBox 18"/>
+          <p:cNvPr id="22" name="TextBox 21"/>
           <p:cNvSpPr txBox="1"/>
           <p:nvPr/>
         </p:nvSpPr>
         <p:spPr>
           <a:xfrm>
-            <a:off x="4857380" y="3793445"/>
+            <a:off x="2909335" y="5220877"/>
             <a:ext cx="657151" cy="646331"/>
           </a:xfrm>
           <a:prstGeom prst="rect">
@@ -3500,28 +3550,30 @@
       </p:sp>
       <p:sp>
         <p:nvSpPr>
-          <p:cNvPr id="23" name="Freeform 22"/>
+          <p:cNvPr id="34" name="Freeform 33"/>
           <p:cNvSpPr/>
           <p:nvPr/>
         </p:nvSpPr>
         <p:spPr>
           <a:xfrm>
-            <a:off x="2694712" y="927543"/>
-            <a:ext cx="3874744" cy="4169300"/>
+            <a:off x="2174875" y="1632432"/>
+            <a:ext cx="4668933" cy="3765068"/>
           </a:xfrm>
           <a:custGeom>
             <a:avLst/>
             <a:gdLst>
-              <a:gd name="connsiteX0" fmla="*/ 0 w 3874744"/>
-              <a:gd name="connsiteY0" fmla="*/ 256572 h 4169300"/>
-              <a:gd name="connsiteX1" fmla="*/ 995499 w 3874744"/>
-              <a:gd name="connsiteY1" fmla="*/ 33478 h 4169300"/>
-              <a:gd name="connsiteX2" fmla="*/ 2935006 w 3874744"/>
-              <a:gd name="connsiteY2" fmla="*/ 891532 h 4169300"/>
-              <a:gd name="connsiteX3" fmla="*/ 3861849 w 3874744"/>
-              <a:gd name="connsiteY3" fmla="*/ 2847896 h 4169300"/>
-              <a:gd name="connsiteX4" fmla="*/ 3501410 w 3874744"/>
-              <a:gd name="connsiteY4" fmla="*/ 4169300 h 4169300"/>
+              <a:gd name="connsiteX0" fmla="*/ 0 w 4668933"/>
+              <a:gd name="connsiteY0" fmla="*/ 955193 h 3765068"/>
+              <a:gd name="connsiteX1" fmla="*/ 1222375 w 4668933"/>
+              <a:gd name="connsiteY1" fmla="*/ 209068 h 3765068"/>
+              <a:gd name="connsiteX2" fmla="*/ 3270250 w 4668933"/>
+              <a:gd name="connsiteY2" fmla="*/ 18568 h 3765068"/>
+              <a:gd name="connsiteX3" fmla="*/ 4587875 w 4668933"/>
+              <a:gd name="connsiteY3" fmla="*/ 574193 h 3765068"/>
+              <a:gd name="connsiteX4" fmla="*/ 4365625 w 4668933"/>
+              <a:gd name="connsiteY4" fmla="*/ 3209443 h 3765068"/>
+              <a:gd name="connsiteX5" fmla="*/ 3048000 w 4668933"/>
+              <a:gd name="connsiteY5" fmla="*/ 3765068 h 3765068"/>
             </a:gdLst>
             <a:ahLst/>
             <a:cxnLst>
@@ -3540,41 +3592,49 @@
               <a:cxn ang="0">
                 <a:pos x="connsiteX4" y="connsiteY4"/>
               </a:cxn>
+              <a:cxn ang="0">
+                <a:pos x="connsiteX5" y="connsiteY5"/>
+              </a:cxn>
             </a:cxnLst>
             <a:rect l="l" t="t" r="r" b="b"/>
             <a:pathLst>
-              <a:path w="3874744" h="4169300">
+              <a:path w="4668933" h="3765068">
                 <a:moveTo>
-                  <a:pt x="0" y="256572"/>
+                  <a:pt x="0" y="955193"/>
                 </a:moveTo>
                 <a:cubicBezTo>
-                  <a:pt x="253165" y="92111"/>
-                  <a:pt x="506331" y="-72349"/>
-                  <a:pt x="995499" y="33478"/>
+                  <a:pt x="338666" y="660182"/>
+                  <a:pt x="677333" y="365172"/>
+                  <a:pt x="1222375" y="209068"/>
                 </a:cubicBezTo>
                 <a:cubicBezTo>
-                  <a:pt x="1484667" y="139305"/>
-                  <a:pt x="2457281" y="422462"/>
-                  <a:pt x="2935006" y="891532"/>
+                  <a:pt x="1767417" y="52964"/>
+                  <a:pt x="2709333" y="-42286"/>
+                  <a:pt x="3270250" y="18568"/>
                 </a:cubicBezTo>
                 <a:cubicBezTo>
-                  <a:pt x="3412731" y="1360602"/>
-                  <a:pt x="3767448" y="2301601"/>
-                  <a:pt x="3861849" y="2847896"/>
+                  <a:pt x="3831167" y="79422"/>
+                  <a:pt x="4405313" y="42381"/>
+                  <a:pt x="4587875" y="574193"/>
                 </a:cubicBezTo>
                 <a:cubicBezTo>
-                  <a:pt x="3956250" y="3394191"/>
-                  <a:pt x="3501410" y="4169300"/>
-                  <a:pt x="3501410" y="4169300"/>
+                  <a:pt x="4770437" y="1106005"/>
+                  <a:pt x="4622271" y="2677631"/>
+                  <a:pt x="4365625" y="3209443"/>
+                </a:cubicBezTo>
+                <a:cubicBezTo>
+                  <a:pt x="4108979" y="3741256"/>
+                  <a:pt x="3048000" y="3765068"/>
+                  <a:pt x="3048000" y="3765068"/>
                 </a:cubicBezTo>
               </a:path>
             </a:pathLst>
           </a:custGeom>
           <a:ln>
             <a:solidFill>
-              <a:srgbClr val="000000"/>
+              <a:schemeClr val="tx1"/>
             </a:solidFill>
-            <a:prstDash val="dash"/>
+            <a:prstDash val="lgDash"/>
           </a:ln>
         </p:spPr>
         <p:style>
@@ -3609,7 +3669,7 @@
           <p:nvPr/>
         </p:nvPicPr>
         <p:blipFill>
-          <a:blip r:embed="rId2" cstate="screen">
+          <a:blip r:embed="rId4" cstate="screen">
             <a:extLst>
               <a:ext uri="{28A0092B-C50C-407E-A947-70E740481C1C}">
                 <a14:useLocalDpi xmlns:a14="http://schemas.microsoft.com/office/drawing/2010/main"/>
@@ -3623,7 +3683,7 @@
         </p:blipFill>
         <p:spPr bwMode="auto">
           <a:xfrm>
-            <a:off x="4857380" y="993495"/>
+            <a:off x="5698755" y="771245"/>
             <a:ext cx="2232524" cy="2247900"/>
           </a:xfrm>
           <a:prstGeom prst="rect">
@@ -3704,6 +3764,59 @@
                       </p:childTnLst>
                     </p:cTn>
                   </p:par>
+                  <p:par>
+                    <p:cTn id="7" fill="hold">
+                      <p:stCondLst>
+                        <p:cond delay="indefinite"/>
+                      </p:stCondLst>
+                      <p:childTnLst>
+                        <p:par>
+                          <p:cTn id="8" fill="hold">
+                            <p:stCondLst>
+                              <p:cond delay="0"/>
+                            </p:stCondLst>
+                            <p:childTnLst>
+                              <p:par>
+                                <p:cTn id="9" presetID="5" presetClass="exit" presetSubtype="10" fill="hold" nodeType="clickEffect">
+                                  <p:stCondLst>
+                                    <p:cond delay="0"/>
+                                  </p:stCondLst>
+                                  <p:childTnLst>
+                                    <p:animEffect transition="out" filter="checkerboard(across)">
+                                      <p:cBhvr>
+                                        <p:cTn id="10" dur="500"/>
+                                        <p:tgtEl>
+                                          <p:spTgt spid="20"/>
+                                        </p:tgtEl>
+                                      </p:cBhvr>
+                                    </p:animEffect>
+                                    <p:set>
+                                      <p:cBhvr>
+                                        <p:cTn id="11" dur="1" fill="hold">
+                                          <p:stCondLst>
+                                            <p:cond delay="499"/>
+                                          </p:stCondLst>
+                                        </p:cTn>
+                                        <p:tgtEl>
+                                          <p:spTgt spid="20"/>
+                                        </p:tgtEl>
+                                        <p:attrNameLst>
+                                          <p:attrName>style.visibility</p:attrName>
+                                        </p:attrNameLst>
+                                      </p:cBhvr>
+                                      <p:to>
+                                        <p:strVal val="hidden"/>
+                                      </p:to>
+                                    </p:set>
+                                  </p:childTnLst>
+                                </p:cTn>
+                              </p:par>
+                            </p:childTnLst>
+                          </p:cTn>
+                        </p:par>
+                      </p:childTnLst>
+                    </p:cTn>
+                  </p:par>
                 </p:childTnLst>
               </p:cTn>
               <p:prevCondLst>
@@ -3727,6 +3840,12 @@
     </p:tnLst>
   </p:timing>
 </p:sld>
+</file>
+
+<file path=ppt/tags/tag1.xml><?xml version="1.0" encoding="utf-8"?>
+<p:tagLst xmlns:a="http://schemas.openxmlformats.org/drawingml/2006/main" xmlns:r="http://schemas.openxmlformats.org/officeDocument/2006/relationships" xmlns:p="http://schemas.openxmlformats.org/presentationml/2006/main">
+  <p:tag name="DVSHAPEID" val="7BKGexDzCjLnkvmqa3zSIQ"/>
+</p:tagLst>
 </file>
 
 <file path=ppt/theme/theme1.xml><?xml version="1.0" encoding="utf-8"?>

</xml_diff>